<commit_message>
Update Tourism Recommendation Application.pptx
</commit_message>
<xml_diff>
--- a/Report/Tourism Recommendation Application.pptx
+++ b/Report/Tourism Recommendation Application.pptx
@@ -4117,6 +4117,49 @@
           <a:prstGeom prst="rect">
             <a:avLst/>
           </a:prstGeom>
+        </p:spPr>
+      </p:pic>
+      <p:pic>
+        <p:nvPicPr>
+          <p:cNvPr id="5" name="Picture 4">
+            <a:extLst>
+              <a:ext uri="{FF2B5EF4-FFF2-40B4-BE49-F238E27FC236}">
+                <a16:creationId xmlns:a16="http://schemas.microsoft.com/office/drawing/2014/main" id="{7F23B6E4-7E96-A7E0-4A1C-5AB8F0B45F24}"/>
+              </a:ext>
+            </a:extLst>
+          </p:cNvPr>
+          <p:cNvPicPr>
+            <a:picLocks noChangeAspect="1"/>
+          </p:cNvPicPr>
+          <p:nvPr/>
+        </p:nvPicPr>
+        <p:blipFill>
+          <a:blip r:embed="rId3" cstate="print">
+            <a:extLst>
+              <a:ext uri="{28A0092B-C50C-407E-A947-70E740481C1C}">
+                <a14:useLocalDpi xmlns:a14="http://schemas.microsoft.com/office/drawing/2010/main" val="0"/>
+              </a:ext>
+            </a:extLst>
+          </a:blip>
+          <a:srcRect/>
+          <a:stretch>
+            <a:fillRect/>
+          </a:stretch>
+        </p:blipFill>
+        <p:spPr bwMode="auto">
+          <a:xfrm>
+            <a:off x="8586331" y="1195636"/>
+            <a:ext cx="1809750" cy="4021455"/>
+          </a:xfrm>
+          <a:prstGeom prst="rect">
+            <a:avLst/>
+          </a:prstGeom>
+          <a:noFill/>
+          <a:ln>
+            <a:solidFill>
+              <a:schemeClr val="tx1"/>
+            </a:solidFill>
+          </a:ln>
         </p:spPr>
       </p:pic>
     </p:spTree>

</xml_diff>